<commit_message>
Replace Presentazione - Savazzi - Alex - Assirelli.pptx
</commit_message>
<xml_diff>
--- a/Approfondimento - Security/Presentazione - Savazzi - Alex - Assirelli.pptx
+++ b/Approfondimento - Security/Presentazione - Savazzi - Alex - Assirelli.pptx
@@ -262,7 +262,7 @@
           <a:p>
             <a:fld id="{B65E5A98-DA83-404B-AF61-44AE5342FB50}" type="datetimeFigureOut">
               <a:rPr lang="it-IT" smtClean="0"/>
-              <a:t>23/11/2022</a:t>
+              <a:t>27/11/2022</a:t>
             </a:fld>
             <a:endParaRPr lang="it-IT"/>
           </a:p>
@@ -678,7 +678,7 @@
           <a:p>
             <a:fld id="{62F13085-FB8A-48A6-9A18-D32F849A60AC}" type="datetime1">
               <a:rPr lang="it-IT" smtClean="0"/>
-              <a:t>23/11/2022</a:t>
+              <a:t>27/11/2022</a:t>
             </a:fld>
             <a:endParaRPr lang="it-IT"/>
           </a:p>
@@ -879,7 +879,7 @@
           <a:p>
             <a:fld id="{62F13085-FB8A-48A6-9A18-D32F849A60AC}" type="datetime1">
               <a:rPr lang="it-IT" smtClean="0"/>
-              <a:t>23/11/2022</a:t>
+              <a:t>27/11/2022</a:t>
             </a:fld>
             <a:endParaRPr lang="it-IT"/>
           </a:p>
@@ -1090,7 +1090,7 @@
           <a:p>
             <a:fld id="{62F13085-FB8A-48A6-9A18-D32F849A60AC}" type="datetime1">
               <a:rPr lang="it-IT" smtClean="0"/>
-              <a:t>23/11/2022</a:t>
+              <a:t>27/11/2022</a:t>
             </a:fld>
             <a:endParaRPr lang="it-IT"/>
           </a:p>
@@ -1291,7 +1291,7 @@
           <a:p>
             <a:fld id="{62F13085-FB8A-48A6-9A18-D32F849A60AC}" type="datetime1">
               <a:rPr lang="it-IT" smtClean="0"/>
-              <a:t>23/11/2022</a:t>
+              <a:t>27/11/2022</a:t>
             </a:fld>
             <a:endParaRPr lang="it-IT"/>
           </a:p>
@@ -1568,7 +1568,7 @@
           <a:p>
             <a:fld id="{62F13085-FB8A-48A6-9A18-D32F849A60AC}" type="datetime1">
               <a:rPr lang="it-IT" smtClean="0"/>
-              <a:t>23/11/2022</a:t>
+              <a:t>27/11/2022</a:t>
             </a:fld>
             <a:endParaRPr lang="it-IT"/>
           </a:p>
@@ -1837,7 +1837,7 @@
           <a:p>
             <a:fld id="{62F13085-FB8A-48A6-9A18-D32F849A60AC}" type="datetime1">
               <a:rPr lang="it-IT" smtClean="0"/>
-              <a:t>23/11/2022</a:t>
+              <a:t>27/11/2022</a:t>
             </a:fld>
             <a:endParaRPr lang="it-IT"/>
           </a:p>
@@ -2253,7 +2253,7 @@
           <a:p>
             <a:fld id="{62F13085-FB8A-48A6-9A18-D32F849A60AC}" type="datetime1">
               <a:rPr lang="it-IT" smtClean="0"/>
-              <a:t>23/11/2022</a:t>
+              <a:t>27/11/2022</a:t>
             </a:fld>
             <a:endParaRPr lang="it-IT"/>
           </a:p>
@@ -2396,7 +2396,7 @@
           <a:p>
             <a:fld id="{62F13085-FB8A-48A6-9A18-D32F849A60AC}" type="datetime1">
               <a:rPr lang="it-IT" smtClean="0"/>
-              <a:t>23/11/2022</a:t>
+              <a:t>27/11/2022</a:t>
             </a:fld>
             <a:endParaRPr lang="it-IT"/>
           </a:p>
@@ -2510,7 +2510,7 @@
           <a:p>
             <a:fld id="{62F13085-FB8A-48A6-9A18-D32F849A60AC}" type="datetime1">
               <a:rPr lang="it-IT" smtClean="0"/>
-              <a:t>23/11/2022</a:t>
+              <a:t>27/11/2022</a:t>
             </a:fld>
             <a:endParaRPr lang="it-IT"/>
           </a:p>
@@ -2824,7 +2824,7 @@
           <a:p>
             <a:fld id="{62F13085-FB8A-48A6-9A18-D32F849A60AC}" type="datetime1">
               <a:rPr lang="it-IT" smtClean="0"/>
-              <a:t>23/11/2022</a:t>
+              <a:t>27/11/2022</a:t>
             </a:fld>
             <a:endParaRPr lang="it-IT"/>
           </a:p>
@@ -3114,7 +3114,7 @@
           <a:p>
             <a:fld id="{62F13085-FB8A-48A6-9A18-D32F849A60AC}" type="datetime1">
               <a:rPr lang="it-IT" smtClean="0"/>
-              <a:t>23/11/2022</a:t>
+              <a:t>27/11/2022</a:t>
             </a:fld>
             <a:endParaRPr lang="it-IT"/>
           </a:p>
@@ -3383,7 +3383,7 @@
           <a:p>
             <a:fld id="{62F13085-FB8A-48A6-9A18-D32F849A60AC}" type="datetime1">
               <a:rPr lang="it-IT" smtClean="0"/>
-              <a:t>23/11/2022</a:t>
+              <a:t>27/11/2022</a:t>
             </a:fld>
             <a:endParaRPr lang="it-IT"/>
           </a:p>
@@ -8483,7 +8483,7 @@
                     <a:p>
                       <a:pPr algn="l" fontAlgn="b"/>
                       <a:r>
-                        <a:rPr lang="it-IT" sz="1100" b="0" i="0" u="none" strike="noStrike">
+                        <a:rPr lang="it-IT" sz="1100" b="0" i="0" u="none" strike="noStrike" dirty="0">
                           <a:solidFill>
                             <a:srgbClr val="000000"/>
                           </a:solidFill>
@@ -17188,7 +17188,7 @@
         <p:spPr>
           <a:xfrm>
             <a:off x="1066799" y="1972659"/>
-            <a:ext cx="10058399" cy="3046988"/>
+            <a:ext cx="10058399" cy="4154984"/>
           </a:xfrm>
           <a:prstGeom prst="rect">
             <a:avLst/>
@@ -17351,6 +17351,28 @@
                 </a:effectLst>
               </a:rPr>
               <a:t>Systems employing an IPS incur a performance cost.</a:t>
+            </a:r>
+          </a:p>
+          <a:p>
+            <a:pPr marL="342900" indent="-342900">
+              <a:buFont typeface="Arial" panose="020B0604020202020204" pitchFamily="34" charset="0"/>
+              <a:buChar char="•"/>
+            </a:pPr>
+            <a:r>
+              <a:rPr lang="en-US" sz="2400" i="1" dirty="0">
+                <a:ln w="0"/>
+                <a:solidFill>
+                  <a:srgbClr val="002060"/>
+                </a:solidFill>
+                <a:effectLst>
+                  <a:outerShdw blurRad="38100" dist="25400" dir="5400000" algn="ctr" rotWithShape="0">
+                    <a:srgbClr val="6E747A">
+                      <a:alpha val="43000"/>
+                    </a:srgbClr>
+                  </a:outerShdw>
+                </a:effectLst>
+              </a:rPr>
+              <a:t>IPSs are available as commercial off-the-shelf components, which makes them unnecessary to develop but perhaps not entirely suited to a specific application.</a:t>
             </a:r>
           </a:p>
         </p:txBody>

</xml_diff>